<commit_message>
Basic overview of the project scope.
</commit_message>
<xml_diff>
--- a/Transfer-Market-PowerPoint.pptx
+++ b/Transfer-Market-PowerPoint.pptx
@@ -3662,13 +3662,13 @@
         </p:nvSpPr>
         <p:spPr>
           <a:xfrm>
-            <a:off x="1524000" y="1631852"/>
+            <a:off x="1524000" y="1392701"/>
             <a:ext cx="9144000" cy="3625948"/>
           </a:xfrm>
         </p:spPr>
         <p:txBody>
           <a:bodyPr>
-            <a:normAutofit/>
+            <a:noAutofit/>
           </a:bodyPr>
           <a:lstStyle/>
           <a:p>
@@ -3677,7 +3677,7 @@
               <a:buChar char="•"/>
             </a:pPr>
             <a:r>
-              <a:rPr lang="en-US" sz="2800" b="1" dirty="0">
+              <a:rPr lang="en-US" b="1" dirty="0">
                 <a:latin typeface="Source Sans Pro Light" panose="020B0604020202020204" pitchFamily="34" charset="0"/>
               </a:rPr>
               <a:t>Teams are spending tens of millions of dollars to bring in new players every year. I thought doing this would be a great way to do a financial analysis!</a:t>
@@ -3688,7 +3688,7 @@
               <a:buFont typeface="Arial" panose="020B0604020202020204" pitchFamily="34" charset="0"/>
               <a:buChar char="•"/>
             </a:pPr>
-            <a:endParaRPr lang="en-US" sz="2800" b="1" dirty="0">
+            <a:endParaRPr lang="en-US" b="1" dirty="0">
               <a:latin typeface="Source Sans Pro Light" panose="020B0604020202020204" pitchFamily="34" charset="0"/>
             </a:endParaRPr>
           </a:p>
@@ -3698,10 +3698,100 @@
               <a:buChar char="•"/>
             </a:pPr>
             <a:r>
-              <a:rPr lang="en-US" sz="2800" b="1" dirty="0">
+              <a:rPr lang="en-US" b="1" dirty="0">
                 <a:latin typeface="Source Sans Pro Light" panose="020B0604020202020204" pitchFamily="34" charset="0"/>
               </a:rPr>
               <a:t>I’m a soccer fan and my team (Liverpool) are trailblazers in using analytics, so I wanted to give it a crack as well!</a:t>
+            </a:r>
+          </a:p>
+          <a:p>
+            <a:pPr marL="457200" indent="-457200" algn="l">
+              <a:buFont typeface="Arial" panose="020B0604020202020204" pitchFamily="34" charset="0"/>
+              <a:buChar char="•"/>
+            </a:pPr>
+            <a:endParaRPr lang="en-US" b="1" dirty="0">
+              <a:latin typeface="Source Sans Pro Light" panose="020B0604020202020204" pitchFamily="34" charset="0"/>
+            </a:endParaRPr>
+          </a:p>
+          <a:p>
+            <a:pPr marL="457200" indent="-457200" algn="l">
+              <a:buFont typeface="Arial" panose="020B0604020202020204" pitchFamily="34" charset="0"/>
+              <a:buChar char="•"/>
+            </a:pPr>
+            <a:r>
+              <a:rPr lang="en-US" b="1" dirty="0">
+                <a:latin typeface="Source Sans Pro Light" panose="020B0604020202020204" pitchFamily="34" charset="0"/>
+              </a:rPr>
+              <a:t>I chose to analyze Europe’s Top 5 Leagues, which are:</a:t>
+            </a:r>
+          </a:p>
+          <a:p>
+            <a:pPr marL="914400" lvl="1" indent="-457200" algn="l">
+              <a:buFont typeface="Arial" panose="020B0604020202020204" pitchFamily="34" charset="0"/>
+              <a:buChar char="•"/>
+            </a:pPr>
+            <a:r>
+              <a:rPr lang="en-US" b="1" dirty="0">
+                <a:latin typeface="Source Sans Pro Light" panose="020B0604020202020204" pitchFamily="34" charset="0"/>
+              </a:rPr>
+              <a:t>English Premier League</a:t>
+            </a:r>
+          </a:p>
+          <a:p>
+            <a:pPr marL="914400" lvl="1" indent="-457200" algn="l">
+              <a:buFont typeface="Arial" panose="020B0604020202020204" pitchFamily="34" charset="0"/>
+              <a:buChar char="•"/>
+            </a:pPr>
+            <a:r>
+              <a:rPr lang="en-US" b="1" dirty="0">
+                <a:latin typeface="Source Sans Pro Light" panose="020B0604020202020204" pitchFamily="34" charset="0"/>
+              </a:rPr>
+              <a:t>French Ligue 1</a:t>
+            </a:r>
+          </a:p>
+          <a:p>
+            <a:pPr marL="914400" lvl="1" indent="-457200" algn="l">
+              <a:buFont typeface="Arial" panose="020B0604020202020204" pitchFamily="34" charset="0"/>
+              <a:buChar char="•"/>
+            </a:pPr>
+            <a:r>
+              <a:rPr lang="en-US" b="1" dirty="0">
+                <a:latin typeface="Source Sans Pro Light" panose="020B0604020202020204" pitchFamily="34" charset="0"/>
+              </a:rPr>
+              <a:t>German </a:t>
+            </a:r>
+            <a:r>
+              <a:rPr lang="en-US" b="1" dirty="0" err="1">
+                <a:latin typeface="Source Sans Pro Light" panose="020B0604020202020204" pitchFamily="34" charset="0"/>
+              </a:rPr>
+              <a:t>Bundesiga</a:t>
+            </a:r>
+            <a:endParaRPr lang="en-US" b="1" dirty="0">
+              <a:latin typeface="Source Sans Pro Light" panose="020B0604020202020204" pitchFamily="34" charset="0"/>
+            </a:endParaRPr>
+          </a:p>
+          <a:p>
+            <a:pPr marL="914400" lvl="1" indent="-457200" algn="l">
+              <a:buFont typeface="Arial" panose="020B0604020202020204" pitchFamily="34" charset="0"/>
+              <a:buChar char="•"/>
+            </a:pPr>
+            <a:r>
+              <a:rPr lang="en-US" b="1" dirty="0">
+                <a:latin typeface="Source Sans Pro Light" panose="020B0604020202020204" pitchFamily="34" charset="0"/>
+              </a:rPr>
+              <a:t>Italian Serie A</a:t>
+            </a:r>
+          </a:p>
+          <a:p>
+            <a:pPr marL="914400" lvl="1" indent="-457200" algn="l">
+              <a:buFont typeface="Arial" panose="020B0604020202020204" pitchFamily="34" charset="0"/>
+              <a:buChar char="•"/>
+            </a:pPr>
+            <a:r>
+              <a:rPr lang="en-US" b="1" dirty="0">
+                <a:latin typeface="Source Sans Pro Light" panose="020B0604020202020204" pitchFamily="34" charset="0"/>
+              </a:rPr>
+              <a:t>Spanish La Liga</a:t>
             </a:r>
           </a:p>
         </p:txBody>

</xml_diff>

<commit_message>
Basic overview of the project as a PowerPoint.
</commit_message>
<xml_diff>
--- a/Transfer-Market-PowerPoint.pptx
+++ b/Transfer-Market-PowerPoint.pptx
@@ -108,6 +108,11 @@
       </a:defRPr>
     </a:lvl9pPr>
   </p:defaultTextStyle>
+  <p:extLst>
+    <p:ext uri="{EFAFB233-063F-42B5-8137-9DF3F51BA10A}">
+      <p15:sldGuideLst xmlns:p15="http://schemas.microsoft.com/office/powerpoint/2012/main"/>
+    </p:ext>
+  </p:extLst>
 </p:presentation>
 </file>
 
@@ -258,7 +263,7 @@
           <a:p>
             <a:fld id="{FA1D6FA6-2F29-4068-8454-98446C90490B}" type="datetimeFigureOut">
               <a:rPr lang="en-US" smtClean="0"/>
-              <a:t>1/2/2020</a:t>
+              <a:t>1/3/2020</a:t>
             </a:fld>
             <a:endParaRPr lang="en-US"/>
           </a:p>
@@ -456,7 +461,7 @@
           <a:p>
             <a:fld id="{FA1D6FA6-2F29-4068-8454-98446C90490B}" type="datetimeFigureOut">
               <a:rPr lang="en-US" smtClean="0"/>
-              <a:t>1/2/2020</a:t>
+              <a:t>1/3/2020</a:t>
             </a:fld>
             <a:endParaRPr lang="en-US"/>
           </a:p>
@@ -664,7 +669,7 @@
           <a:p>
             <a:fld id="{FA1D6FA6-2F29-4068-8454-98446C90490B}" type="datetimeFigureOut">
               <a:rPr lang="en-US" smtClean="0"/>
-              <a:t>1/2/2020</a:t>
+              <a:t>1/3/2020</a:t>
             </a:fld>
             <a:endParaRPr lang="en-US"/>
           </a:p>
@@ -862,7 +867,7 @@
           <a:p>
             <a:fld id="{FA1D6FA6-2F29-4068-8454-98446C90490B}" type="datetimeFigureOut">
               <a:rPr lang="en-US" smtClean="0"/>
-              <a:t>1/2/2020</a:t>
+              <a:t>1/3/2020</a:t>
             </a:fld>
             <a:endParaRPr lang="en-US"/>
           </a:p>
@@ -1137,7 +1142,7 @@
           <a:p>
             <a:fld id="{FA1D6FA6-2F29-4068-8454-98446C90490B}" type="datetimeFigureOut">
               <a:rPr lang="en-US" smtClean="0"/>
-              <a:t>1/2/2020</a:t>
+              <a:t>1/3/2020</a:t>
             </a:fld>
             <a:endParaRPr lang="en-US"/>
           </a:p>
@@ -1402,7 +1407,7 @@
           <a:p>
             <a:fld id="{FA1D6FA6-2F29-4068-8454-98446C90490B}" type="datetimeFigureOut">
               <a:rPr lang="en-US" smtClean="0"/>
-              <a:t>1/2/2020</a:t>
+              <a:t>1/3/2020</a:t>
             </a:fld>
             <a:endParaRPr lang="en-US"/>
           </a:p>
@@ -1814,7 +1819,7 @@
           <a:p>
             <a:fld id="{FA1D6FA6-2F29-4068-8454-98446C90490B}" type="datetimeFigureOut">
               <a:rPr lang="en-US" smtClean="0"/>
-              <a:t>1/2/2020</a:t>
+              <a:t>1/3/2020</a:t>
             </a:fld>
             <a:endParaRPr lang="en-US"/>
           </a:p>
@@ -1955,7 +1960,7 @@
           <a:p>
             <a:fld id="{FA1D6FA6-2F29-4068-8454-98446C90490B}" type="datetimeFigureOut">
               <a:rPr lang="en-US" smtClean="0"/>
-              <a:t>1/2/2020</a:t>
+              <a:t>1/3/2020</a:t>
             </a:fld>
             <a:endParaRPr lang="en-US"/>
           </a:p>
@@ -2068,7 +2073,7 @@
           <a:p>
             <a:fld id="{FA1D6FA6-2F29-4068-8454-98446C90490B}" type="datetimeFigureOut">
               <a:rPr lang="en-US" smtClean="0"/>
-              <a:t>1/2/2020</a:t>
+              <a:t>1/3/2020</a:t>
             </a:fld>
             <a:endParaRPr lang="en-US"/>
           </a:p>
@@ -2379,7 +2384,7 @@
           <a:p>
             <a:fld id="{FA1D6FA6-2F29-4068-8454-98446C90490B}" type="datetimeFigureOut">
               <a:rPr lang="en-US" smtClean="0"/>
-              <a:t>1/2/2020</a:t>
+              <a:t>1/3/2020</a:t>
             </a:fld>
             <a:endParaRPr lang="en-US"/>
           </a:p>
@@ -2667,7 +2672,7 @@
           <a:p>
             <a:fld id="{FA1D6FA6-2F29-4068-8454-98446C90490B}" type="datetimeFigureOut">
               <a:rPr lang="en-US" smtClean="0"/>
-              <a:t>1/2/2020</a:t>
+              <a:t>1/3/2020</a:t>
             </a:fld>
             <a:endParaRPr lang="en-US"/>
           </a:p>
@@ -2908,7 +2913,7 @@
           <a:p>
             <a:fld id="{FA1D6FA6-2F29-4068-8454-98446C90490B}" type="datetimeFigureOut">
               <a:rPr lang="en-US" smtClean="0"/>
-              <a:t>1/2/2020</a:t>
+              <a:t>1/3/2020</a:t>
             </a:fld>
             <a:endParaRPr lang="en-US"/>
           </a:p>
@@ -3314,9 +3319,9 @@
     <p:bg>
       <p:bgPr>
         <a:solidFill>
-          <a:srgbClr val="000099">
-            <a:alpha val="15000"/>
-          </a:srgbClr>
+          <a:schemeClr val="bg1">
+            <a:lumMod val="95000"/>
+          </a:schemeClr>
         </a:solidFill>
         <a:effectLst/>
       </p:bgPr>
@@ -3364,9 +3369,14 @@
           <a:lstStyle/>
           <a:p>
             <a:r>
-              <a:rPr lang="en-US" sz="4400" dirty="0">
-                <a:solidFill>
-                  <a:srgbClr val="000099"/>
+              <a:rPr lang="en-US" sz="6600" dirty="0">
+                <a:ln w="9525">
+                  <a:solidFill>
+                    <a:srgbClr val="0055A4"/>
+                  </a:solidFill>
+                </a:ln>
+                <a:solidFill>
+                  <a:srgbClr val="EF4135"/>
                 </a:solidFill>
                 <a:latin typeface="Source Sans Pro" panose="020B0604020202020204" pitchFamily="34" charset="0"/>
               </a:rPr>
@@ -3391,7 +3401,12 @@
             <p:ph type="subTitle" idx="1"/>
           </p:nvPr>
         </p:nvSpPr>
-        <p:spPr/>
+        <p:spPr>
+          <a:xfrm>
+            <a:off x="1524000" y="3602038"/>
+            <a:ext cx="9144000" cy="1110639"/>
+          </a:xfrm>
+        </p:spPr>
         <p:txBody>
           <a:bodyPr>
             <a:normAutofit/>
@@ -3399,11 +3414,49 @@
           <a:lstStyle/>
           <a:p>
             <a:r>
-              <a:rPr lang="en-US" sz="3600" b="1" dirty="0">
+              <a:rPr lang="en-US" sz="6000" b="1" dirty="0">
+                <a:ln>
+                  <a:solidFill>
+                    <a:srgbClr val="EF4135">
+                      <a:alpha val="20000"/>
+                    </a:srgbClr>
+                  </a:solidFill>
+                </a:ln>
+                <a:solidFill>
+                  <a:srgbClr val="000066"/>
+                </a:solidFill>
                 <a:latin typeface="Source Sans Pro Light" panose="020B0604020202020204" pitchFamily="34" charset="0"/>
               </a:rPr>
               <a:t>By Sam Lawson</a:t>
             </a:r>
+            <a:endParaRPr lang="en-US" sz="3000" b="1" dirty="0">
+              <a:ln>
+                <a:solidFill>
+                  <a:srgbClr val="EF4135">
+                    <a:alpha val="20000"/>
+                  </a:srgbClr>
+                </a:solidFill>
+              </a:ln>
+              <a:solidFill>
+                <a:srgbClr val="000066"/>
+              </a:solidFill>
+              <a:latin typeface="Source Sans Pro Light" panose="020B0604020202020204" pitchFamily="34" charset="0"/>
+            </a:endParaRPr>
+          </a:p>
+          <a:p>
+            <a:endParaRPr lang="en-US" sz="6000" b="1" dirty="0">
+              <a:ln>
+                <a:solidFill>
+                  <a:srgbClr val="EF4135">
+                    <a:alpha val="20000"/>
+                  </a:srgbClr>
+                </a:solidFill>
+              </a:ln>
+              <a:solidFill>
+                <a:srgbClr val="000066"/>
+              </a:solidFill>
+              <a:latin typeface="Source Sans Pro Light" panose="020B0604020202020204" pitchFamily="34" charset="0"/>
+            </a:endParaRPr>
           </a:p>
         </p:txBody>
       </p:sp>
@@ -3426,9 +3479,9 @@
     <p:bg>
       <p:bgPr>
         <a:solidFill>
-          <a:srgbClr val="000099">
-            <a:alpha val="15000"/>
-          </a:srgbClr>
+          <a:schemeClr val="bg1">
+            <a:lumMod val="95000"/>
+          </a:schemeClr>
         </a:solidFill>
         <a:effectLst/>
       </p:bgPr>
@@ -3465,9 +3518,14 @@
         </p:nvSpPr>
         <p:spPr>
           <a:xfrm>
-            <a:off x="1523999" y="506194"/>
+            <a:off x="1524000" y="967154"/>
             <a:ext cx="9144001" cy="759900"/>
           </a:xfrm>
+          <a:solidFill>
+            <a:schemeClr val="bg1">
+              <a:lumMod val="95000"/>
+            </a:schemeClr>
+          </a:solidFill>
         </p:spPr>
         <p:txBody>
           <a:bodyPr>
@@ -3476,9 +3534,14 @@
           <a:lstStyle/>
           <a:p>
             <a:r>
-              <a:rPr lang="en-US" sz="4400" dirty="0">
-                <a:solidFill>
-                  <a:srgbClr val="000099"/>
+              <a:rPr lang="en-US" sz="6600" dirty="0">
+                <a:ln cmpd="sng">
+                  <a:solidFill>
+                    <a:srgbClr val="0055A4"/>
+                  </a:solidFill>
+                </a:ln>
+                <a:solidFill>
+                  <a:srgbClr val="EF4135"/>
                 </a:solidFill>
                 <a:latin typeface="Source Sans Pro" panose="020B0604020202020204" pitchFamily="34" charset="0"/>
               </a:rPr>
@@ -3505,13 +3568,13 @@
         </p:nvSpPr>
         <p:spPr>
           <a:xfrm>
-            <a:off x="1524000" y="1631852"/>
+            <a:off x="1524000" y="2264898"/>
             <a:ext cx="9144000" cy="3625948"/>
           </a:xfrm>
         </p:spPr>
         <p:txBody>
           <a:bodyPr>
-            <a:normAutofit fontScale="85000" lnSpcReduction="10000"/>
+            <a:normAutofit fontScale="92500" lnSpcReduction="20000"/>
           </a:bodyPr>
           <a:lstStyle/>
           <a:p>
@@ -3521,6 +3584,16 @@
             </a:pPr>
             <a:r>
               <a:rPr lang="en-US" sz="2800" b="1" dirty="0">
+                <a:ln>
+                  <a:solidFill>
+                    <a:srgbClr val="EF4135">
+                      <a:alpha val="20000"/>
+                    </a:srgbClr>
+                  </a:solidFill>
+                </a:ln>
+                <a:solidFill>
+                  <a:srgbClr val="000066"/>
+                </a:solidFill>
                 <a:latin typeface="Source Sans Pro Light" panose="020B0604020202020204" pitchFamily="34" charset="0"/>
               </a:rPr>
               <a:t>The European Soccer Transfer Market is where soccer players are purchased and sold from one team to another with the goal of improving results on the field.</a:t>
@@ -3529,6 +3602,16 @@
           <a:p>
             <a:pPr algn="l"/>
             <a:endParaRPr lang="en-US" sz="2800" b="1" dirty="0">
+              <a:ln>
+                <a:solidFill>
+                  <a:srgbClr val="EF4135">
+                    <a:alpha val="20000"/>
+                  </a:srgbClr>
+                </a:solidFill>
+              </a:ln>
+              <a:solidFill>
+                <a:srgbClr val="000066"/>
+              </a:solidFill>
               <a:latin typeface="Source Sans Pro Light" panose="020B0604020202020204" pitchFamily="34" charset="0"/>
             </a:endParaRPr>
           </a:p>
@@ -3539,6 +3622,16 @@
             </a:pPr>
             <a:r>
               <a:rPr lang="en-US" sz="2800" b="1" dirty="0">
+                <a:ln>
+                  <a:solidFill>
+                    <a:srgbClr val="EF4135">
+                      <a:alpha val="20000"/>
+                    </a:srgbClr>
+                  </a:solidFill>
+                </a:ln>
+                <a:solidFill>
+                  <a:srgbClr val="000066"/>
+                </a:solidFill>
                 <a:latin typeface="Source Sans Pro Light" panose="020B0604020202020204" pitchFamily="34" charset="0"/>
               </a:rPr>
               <a:t>The Transfer Market works similarly to how player trades work in American sports, only instead of exchanging one player for another, teams are exchanging a player for cash.</a:t>
@@ -3547,6 +3640,16 @@
           <a:p>
             <a:pPr algn="l"/>
             <a:endParaRPr lang="en-US" sz="2800" b="1" dirty="0">
+              <a:ln>
+                <a:solidFill>
+                  <a:srgbClr val="EF4135">
+                    <a:alpha val="20000"/>
+                  </a:srgbClr>
+                </a:solidFill>
+              </a:ln>
+              <a:solidFill>
+                <a:srgbClr val="000066"/>
+              </a:solidFill>
               <a:latin typeface="Source Sans Pro Light" panose="020B0604020202020204" pitchFamily="34" charset="0"/>
             </a:endParaRPr>
           </a:p>
@@ -3557,9 +3660,19 @@
             </a:pPr>
             <a:r>
               <a:rPr lang="en-US" sz="2800" b="1" dirty="0">
+                <a:ln>
+                  <a:solidFill>
+                    <a:srgbClr val="EF4135">
+                      <a:alpha val="20000"/>
+                    </a:srgbClr>
+                  </a:solidFill>
+                </a:ln>
+                <a:solidFill>
+                  <a:srgbClr val="000066"/>
+                </a:solidFill>
                 <a:latin typeface="Source Sans Pro Light" panose="020B0604020202020204" pitchFamily="34" charset="0"/>
               </a:rPr>
-              <a:t>Players can be transferred across leagues, countries, and continents. So a player in China can be purchased by a team in England.</a:t>
+              <a:t>Players can be transferred across leagues, countries, and continents. </a:t>
             </a:r>
           </a:p>
         </p:txBody>
@@ -3583,9 +3696,9 @@
     <p:bg>
       <p:bgPr>
         <a:solidFill>
-          <a:srgbClr val="000099">
-            <a:alpha val="15000"/>
-          </a:srgbClr>
+          <a:schemeClr val="bg1">
+            <a:lumMod val="95000"/>
+          </a:schemeClr>
         </a:solidFill>
         <a:effectLst/>
       </p:bgPr>
@@ -3622,7 +3735,7 @@
         </p:nvSpPr>
         <p:spPr>
           <a:xfrm>
-            <a:off x="1523999" y="506194"/>
+            <a:off x="1523999" y="856126"/>
             <a:ext cx="9144001" cy="759900"/>
           </a:xfrm>
         </p:spPr>
@@ -3633,9 +3746,14 @@
           <a:lstStyle/>
           <a:p>
             <a:r>
-              <a:rPr lang="en-US" sz="4400" dirty="0">
-                <a:solidFill>
-                  <a:srgbClr val="000099"/>
+              <a:rPr lang="en-US" sz="6600" dirty="0">
+                <a:ln>
+                  <a:solidFill>
+                    <a:srgbClr val="0055A4"/>
+                  </a:solidFill>
+                </a:ln>
+                <a:solidFill>
+                  <a:srgbClr val="EF4135"/>
                 </a:solidFill>
                 <a:latin typeface="Source Sans Pro" panose="020B0604020202020204" pitchFamily="34" charset="0"/>
               </a:rPr>
@@ -3662,7 +3780,7 @@
         </p:nvSpPr>
         <p:spPr>
           <a:xfrm>
-            <a:off x="1524000" y="1392701"/>
+            <a:off x="1524000" y="1616026"/>
             <a:ext cx="9144000" cy="3625948"/>
           </a:xfrm>
         </p:spPr>
@@ -3678,9 +3796,19 @@
             </a:pPr>
             <a:r>
               <a:rPr lang="en-US" b="1" dirty="0">
+                <a:ln w="0">
+                  <a:solidFill>
+                    <a:srgbClr val="EF4135">
+                      <a:alpha val="20000"/>
+                    </a:srgbClr>
+                  </a:solidFill>
+                </a:ln>
+                <a:solidFill>
+                  <a:srgbClr val="000066"/>
+                </a:solidFill>
                 <a:latin typeface="Source Sans Pro Light" panose="020B0604020202020204" pitchFamily="34" charset="0"/>
               </a:rPr>
-              <a:t>Teams are spending tens of millions of dollars to bring in new players every year. I thought doing this would be a great way to do a financial analysis!</a:t>
+              <a:t>Teams are spending millions and millions of dollars to bring in new players every year. I thought doing this would be a great way to do a financial analysis!</a:t>
             </a:r>
           </a:p>
           <a:p>
@@ -3689,6 +3817,16 @@
               <a:buChar char="•"/>
             </a:pPr>
             <a:endParaRPr lang="en-US" b="1" dirty="0">
+              <a:ln w="0">
+                <a:solidFill>
+                  <a:srgbClr val="EF4135">
+                    <a:alpha val="20000"/>
+                  </a:srgbClr>
+                </a:solidFill>
+              </a:ln>
+              <a:solidFill>
+                <a:srgbClr val="000066"/>
+              </a:solidFill>
               <a:latin typeface="Source Sans Pro Light" panose="020B0604020202020204" pitchFamily="34" charset="0"/>
             </a:endParaRPr>
           </a:p>
@@ -3699,6 +3837,16 @@
             </a:pPr>
             <a:r>
               <a:rPr lang="en-US" b="1" dirty="0">
+                <a:ln w="0">
+                  <a:solidFill>
+                    <a:srgbClr val="EF4135">
+                      <a:alpha val="20000"/>
+                    </a:srgbClr>
+                  </a:solidFill>
+                </a:ln>
+                <a:solidFill>
+                  <a:srgbClr val="000066"/>
+                </a:solidFill>
                 <a:latin typeface="Source Sans Pro Light" panose="020B0604020202020204" pitchFamily="34" charset="0"/>
               </a:rPr>
               <a:t>I’m a soccer fan and my team (Liverpool) are trailblazers in using analytics, so I wanted to give it a crack as well!</a:t>
@@ -3710,6 +3858,16 @@
               <a:buChar char="•"/>
             </a:pPr>
             <a:endParaRPr lang="en-US" b="1" dirty="0">
+              <a:ln w="0">
+                <a:solidFill>
+                  <a:srgbClr val="EF4135">
+                    <a:alpha val="20000"/>
+                  </a:srgbClr>
+                </a:solidFill>
+              </a:ln>
+              <a:solidFill>
+                <a:srgbClr val="000066"/>
+              </a:solidFill>
               <a:latin typeface="Source Sans Pro Light" panose="020B0604020202020204" pitchFamily="34" charset="0"/>
             </a:endParaRPr>
           </a:p>
@@ -3720,6 +3878,16 @@
             </a:pPr>
             <a:r>
               <a:rPr lang="en-US" b="1" dirty="0">
+                <a:ln w="0">
+                  <a:solidFill>
+                    <a:srgbClr val="EF4135">
+                      <a:alpha val="20000"/>
+                    </a:srgbClr>
+                  </a:solidFill>
+                </a:ln>
+                <a:solidFill>
+                  <a:srgbClr val="000066"/>
+                </a:solidFill>
                 <a:latin typeface="Source Sans Pro Light" panose="020B0604020202020204" pitchFamily="34" charset="0"/>
               </a:rPr>
               <a:t>I chose to analyze Europe’s Top 5 Leagues, which are:</a:t>
@@ -3732,6 +3900,16 @@
             </a:pPr>
             <a:r>
               <a:rPr lang="en-US" b="1" dirty="0">
+                <a:ln w="0">
+                  <a:solidFill>
+                    <a:srgbClr val="EF4135">
+                      <a:alpha val="20000"/>
+                    </a:srgbClr>
+                  </a:solidFill>
+                </a:ln>
+                <a:solidFill>
+                  <a:srgbClr val="000066"/>
+                </a:solidFill>
                 <a:latin typeface="Source Sans Pro Light" panose="020B0604020202020204" pitchFamily="34" charset="0"/>
               </a:rPr>
               <a:t>English Premier League</a:t>
@@ -3744,6 +3922,16 @@
             </a:pPr>
             <a:r>
               <a:rPr lang="en-US" b="1" dirty="0">
+                <a:ln w="0">
+                  <a:solidFill>
+                    <a:srgbClr val="EF4135">
+                      <a:alpha val="20000"/>
+                    </a:srgbClr>
+                  </a:solidFill>
+                </a:ln>
+                <a:solidFill>
+                  <a:srgbClr val="000066"/>
+                </a:solidFill>
                 <a:latin typeface="Source Sans Pro Light" panose="020B0604020202020204" pitchFamily="34" charset="0"/>
               </a:rPr>
               <a:t>French Ligue 1</a:t>
@@ -3756,19 +3944,20 @@
             </a:pPr>
             <a:r>
               <a:rPr lang="en-US" b="1" dirty="0">
+                <a:ln w="0">
+                  <a:solidFill>
+                    <a:srgbClr val="EF4135">
+                      <a:alpha val="20000"/>
+                    </a:srgbClr>
+                  </a:solidFill>
+                </a:ln>
+                <a:solidFill>
+                  <a:srgbClr val="000066"/>
+                </a:solidFill>
                 <a:latin typeface="Source Sans Pro Light" panose="020B0604020202020204" pitchFamily="34" charset="0"/>
               </a:rPr>
-              <a:t>German </a:t>
-            </a:r>
-            <a:r>
-              <a:rPr lang="en-US" b="1" dirty="0" err="1">
-                <a:latin typeface="Source Sans Pro Light" panose="020B0604020202020204" pitchFamily="34" charset="0"/>
-              </a:rPr>
-              <a:t>Bundesiga</a:t>
-            </a:r>
-            <a:endParaRPr lang="en-US" b="1" dirty="0">
-              <a:latin typeface="Source Sans Pro Light" panose="020B0604020202020204" pitchFamily="34" charset="0"/>
-            </a:endParaRPr>
+              <a:t>German Bundesliga</a:t>
+            </a:r>
           </a:p>
           <a:p>
             <a:pPr marL="914400" lvl="1" indent="-457200" algn="l">
@@ -3777,6 +3966,16 @@
             </a:pPr>
             <a:r>
               <a:rPr lang="en-US" b="1" dirty="0">
+                <a:ln w="0">
+                  <a:solidFill>
+                    <a:srgbClr val="EF4135">
+                      <a:alpha val="20000"/>
+                    </a:srgbClr>
+                  </a:solidFill>
+                </a:ln>
+                <a:solidFill>
+                  <a:srgbClr val="000066"/>
+                </a:solidFill>
                 <a:latin typeface="Source Sans Pro Light" panose="020B0604020202020204" pitchFamily="34" charset="0"/>
               </a:rPr>
               <a:t>Italian Serie A</a:t>
@@ -3789,6 +3988,16 @@
             </a:pPr>
             <a:r>
               <a:rPr lang="en-US" b="1" dirty="0">
+                <a:ln w="0">
+                  <a:solidFill>
+                    <a:srgbClr val="EF4135">
+                      <a:alpha val="20000"/>
+                    </a:srgbClr>
+                  </a:solidFill>
+                </a:ln>
+                <a:solidFill>
+                  <a:srgbClr val="000066"/>
+                </a:solidFill>
                 <a:latin typeface="Source Sans Pro Light" panose="020B0604020202020204" pitchFamily="34" charset="0"/>
               </a:rPr>
               <a:t>Spanish La Liga</a:t>
@@ -3815,9 +4024,9 @@
     <p:bg>
       <p:bgPr>
         <a:solidFill>
-          <a:srgbClr val="000099">
-            <a:alpha val="15000"/>
-          </a:srgbClr>
+          <a:schemeClr val="bg1">
+            <a:lumMod val="95000"/>
+          </a:schemeClr>
         </a:solidFill>
         <a:effectLst/>
       </p:bgPr>
@@ -3854,7 +4063,7 @@
         </p:nvSpPr>
         <p:spPr>
           <a:xfrm>
-            <a:off x="1523999" y="506194"/>
+            <a:off x="1524000" y="854612"/>
             <a:ext cx="9144001" cy="759900"/>
           </a:xfrm>
         </p:spPr>
@@ -3865,9 +4074,14 @@
           <a:lstStyle/>
           <a:p>
             <a:r>
-              <a:rPr lang="en-US" sz="4400" dirty="0">
-                <a:solidFill>
-                  <a:srgbClr val="000099"/>
+              <a:rPr lang="en-US" sz="6600" dirty="0">
+                <a:ln>
+                  <a:solidFill>
+                    <a:srgbClr val="0055A4"/>
+                  </a:solidFill>
+                </a:ln>
+                <a:solidFill>
+                  <a:srgbClr val="EF4135"/>
                 </a:solidFill>
                 <a:latin typeface="Source Sans Pro" panose="020B0604020202020204" pitchFamily="34" charset="0"/>
               </a:rPr>
@@ -3894,7 +4108,7 @@
         </p:nvSpPr>
         <p:spPr>
           <a:xfrm>
-            <a:off x="1524000" y="1631852"/>
+            <a:off x="1524000" y="2377440"/>
             <a:ext cx="9144000" cy="3625948"/>
           </a:xfrm>
         </p:spPr>
@@ -3910,6 +4124,16 @@
             </a:pPr>
             <a:r>
               <a:rPr lang="en-US" sz="2800" b="1" dirty="0">
+                <a:ln>
+                  <a:solidFill>
+                    <a:srgbClr val="EF4135">
+                      <a:alpha val="20000"/>
+                    </a:srgbClr>
+                  </a:solidFill>
+                </a:ln>
+                <a:solidFill>
+                  <a:srgbClr val="000066"/>
+                </a:solidFill>
                 <a:latin typeface="Source Sans Pro Light" panose="020B0604020202020204" pitchFamily="34" charset="0"/>
               </a:rPr>
               <a:t>Main Question: </a:t>
@@ -3922,6 +4146,16 @@
             </a:pPr>
             <a:r>
               <a:rPr lang="en-US" sz="2400" b="1" dirty="0">
+                <a:ln>
+                  <a:solidFill>
+                    <a:srgbClr val="EF4135">
+                      <a:alpha val="20000"/>
+                    </a:srgbClr>
+                  </a:solidFill>
+                </a:ln>
+                <a:solidFill>
+                  <a:srgbClr val="000066"/>
+                </a:solidFill>
                 <a:latin typeface="Source Sans Pro Light" panose="020B0403030403020204" pitchFamily="34" charset="0"/>
                 <a:ea typeface="Source Sans Pro Light" panose="020B0403030403020204" pitchFamily="34" charset="0"/>
               </a:rPr>
@@ -3934,6 +4168,16 @@
               <a:buChar char="•"/>
             </a:pPr>
             <a:endParaRPr lang="en-US" sz="2800" b="1" dirty="0">
+              <a:ln>
+                <a:solidFill>
+                  <a:srgbClr val="EF4135">
+                    <a:alpha val="20000"/>
+                  </a:srgbClr>
+                </a:solidFill>
+              </a:ln>
+              <a:solidFill>
+                <a:srgbClr val="000066"/>
+              </a:solidFill>
               <a:latin typeface="Source Sans Pro Light" panose="020B0604020202020204" pitchFamily="34" charset="0"/>
             </a:endParaRPr>
           </a:p>
@@ -3944,6 +4188,16 @@
             </a:pPr>
             <a:r>
               <a:rPr lang="en-US" sz="2800" b="1" dirty="0">
+                <a:ln>
+                  <a:solidFill>
+                    <a:srgbClr val="EF4135">
+                      <a:alpha val="20000"/>
+                    </a:srgbClr>
+                  </a:solidFill>
+                </a:ln>
+                <a:solidFill>
+                  <a:srgbClr val="000066"/>
+                </a:solidFill>
                 <a:latin typeface="Source Sans Pro Light" panose="020B0604020202020204" pitchFamily="34" charset="0"/>
               </a:rPr>
               <a:t>Secondary Questions:</a:t>
@@ -3956,6 +4210,16 @@
             </a:pPr>
             <a:r>
               <a:rPr lang="en-US" sz="2400" b="1" dirty="0">
+                <a:ln>
+                  <a:solidFill>
+                    <a:srgbClr val="EF4135">
+                      <a:alpha val="20000"/>
+                    </a:srgbClr>
+                  </a:solidFill>
+                </a:ln>
+                <a:solidFill>
+                  <a:srgbClr val="000066"/>
+                </a:solidFill>
                 <a:latin typeface="Source Sans Pro Light" panose="020B0403030403020204" pitchFamily="34" charset="0"/>
                 <a:ea typeface="Source Sans Pro Light" panose="020B0403030403020204" pitchFamily="34" charset="0"/>
               </a:rPr>
@@ -3969,6 +4233,16 @@
             </a:pPr>
             <a:r>
               <a:rPr lang="en-US" sz="2400" b="1" dirty="0">
+                <a:ln>
+                  <a:solidFill>
+                    <a:srgbClr val="EF4135">
+                      <a:alpha val="20000"/>
+                    </a:srgbClr>
+                  </a:solidFill>
+                </a:ln>
+                <a:solidFill>
+                  <a:srgbClr val="000066"/>
+                </a:solidFill>
                 <a:latin typeface="Source Sans Pro Light" panose="020B0403030403020204" pitchFamily="34" charset="0"/>
                 <a:ea typeface="Source Sans Pro Light" panose="020B0403030403020204" pitchFamily="34" charset="0"/>
               </a:rPr>
@@ -3982,6 +4256,16 @@
             </a:pPr>
             <a:r>
               <a:rPr lang="en-US" sz="2400" b="1" dirty="0">
+                <a:ln>
+                  <a:solidFill>
+                    <a:srgbClr val="EF4135">
+                      <a:alpha val="20000"/>
+                    </a:srgbClr>
+                  </a:solidFill>
+                </a:ln>
+                <a:solidFill>
+                  <a:srgbClr val="000066"/>
+                </a:solidFill>
                 <a:latin typeface="Source Sans Pro Light" panose="020B0403030403020204" pitchFamily="34" charset="0"/>
                 <a:ea typeface="Source Sans Pro Light" panose="020B0403030403020204" pitchFamily="34" charset="0"/>
               </a:rPr>
@@ -4018,9 +4302,9 @@
     <p:bg>
       <p:bgPr>
         <a:solidFill>
-          <a:srgbClr val="000099">
-            <a:alpha val="15000"/>
-          </a:srgbClr>
+          <a:schemeClr val="bg1">
+            <a:lumMod val="95000"/>
+          </a:schemeClr>
         </a:solidFill>
         <a:effectLst/>
       </p:bgPr>
@@ -4057,7 +4341,7 @@
         </p:nvSpPr>
         <p:spPr>
           <a:xfrm>
-            <a:off x="1523999" y="506194"/>
+            <a:off x="1523998" y="942293"/>
             <a:ext cx="9144001" cy="759900"/>
           </a:xfrm>
         </p:spPr>
@@ -4068,9 +4352,14 @@
           <a:lstStyle/>
           <a:p>
             <a:r>
-              <a:rPr lang="en-US" sz="4400" dirty="0">
-                <a:solidFill>
-                  <a:srgbClr val="000099"/>
+              <a:rPr lang="en-US" sz="6600" dirty="0">
+                <a:ln>
+                  <a:solidFill>
+                    <a:srgbClr val="0055A4"/>
+                  </a:solidFill>
+                </a:ln>
+                <a:solidFill>
+                  <a:srgbClr val="EF4135"/>
                 </a:solidFill>
                 <a:latin typeface="Source Sans Pro" panose="020B0604020202020204" pitchFamily="34" charset="0"/>
               </a:rPr>
@@ -4097,7 +4386,7 @@
         </p:nvSpPr>
         <p:spPr>
           <a:xfrm>
-            <a:off x="1524000" y="1631852"/>
+            <a:off x="1523999" y="2419643"/>
             <a:ext cx="9144000" cy="3625948"/>
           </a:xfrm>
         </p:spPr>
@@ -4112,16 +4401,54 @@
               <a:buChar char="•"/>
             </a:pPr>
             <a:r>
-              <a:rPr lang="en-US" sz="2600" dirty="0"/>
+              <a:rPr lang="en-US" sz="2600" dirty="0">
+                <a:ln>
+                  <a:solidFill>
+                    <a:srgbClr val="EF4135">
+                      <a:alpha val="20000"/>
+                    </a:srgbClr>
+                  </a:solidFill>
+                </a:ln>
+                <a:solidFill>
+                  <a:srgbClr val="000066"/>
+                </a:solidFill>
+              </a:rPr>
               <a:t>Player transfer data was found via </a:t>
             </a:r>
             <a:r>
               <a:rPr lang="en-US" sz="2600" dirty="0">
-                <a:hlinkClick r:id="rId2"/>
+                <a:ln>
+                  <a:solidFill>
+                    <a:srgbClr val="EF4135">
+                      <a:alpha val="20000"/>
+                    </a:srgbClr>
+                  </a:solidFill>
+                </a:ln>
+                <a:solidFill>
+                  <a:srgbClr val="000066"/>
+                </a:solidFill>
+                <a:hlinkClick r:id="rId2">
+                  <a:extLst>
+                    <a:ext uri="{A12FA001-AC4F-418D-AE19-62706E023703}">
+                      <ahyp:hlinkClr xmlns:ahyp="http://schemas.microsoft.com/office/drawing/2018/hyperlinkcolor" val="tx"/>
+                    </a:ext>
+                  </a:extLst>
+                </a:hlinkClick>
               </a:rPr>
               <a:t>Transfermarkt.co.uk</a:t>
             </a:r>
-            <a:endParaRPr lang="en-US" sz="2600" dirty="0"/>
+            <a:endParaRPr lang="en-US" sz="2600" dirty="0">
+              <a:ln>
+                <a:solidFill>
+                  <a:srgbClr val="EF4135">
+                    <a:alpha val="20000"/>
+                  </a:srgbClr>
+                </a:solidFill>
+              </a:ln>
+              <a:solidFill>
+                <a:srgbClr val="000066"/>
+              </a:solidFill>
+            </a:endParaRPr>
           </a:p>
           <a:p>
             <a:pPr marL="342900" indent="-342900" algn="l">
@@ -4129,16 +4456,54 @@
               <a:buChar char="•"/>
             </a:pPr>
             <a:r>
-              <a:rPr lang="en-US" sz="2600" dirty="0"/>
+              <a:rPr lang="en-US" sz="2600" dirty="0">
+                <a:ln>
+                  <a:solidFill>
+                    <a:srgbClr val="EF4135">
+                      <a:alpha val="20000"/>
+                    </a:srgbClr>
+                  </a:solidFill>
+                </a:ln>
+                <a:solidFill>
+                  <a:srgbClr val="000066"/>
+                </a:solidFill>
+              </a:rPr>
               <a:t>Match data was found via </a:t>
             </a:r>
             <a:r>
               <a:rPr lang="en-US" sz="2600" dirty="0">
-                <a:hlinkClick r:id="rId3"/>
+                <a:ln>
+                  <a:solidFill>
+                    <a:srgbClr val="EF4135">
+                      <a:alpha val="20000"/>
+                    </a:srgbClr>
+                  </a:solidFill>
+                </a:ln>
+                <a:solidFill>
+                  <a:srgbClr val="000066"/>
+                </a:solidFill>
+                <a:hlinkClick r:id="rId3">
+                  <a:extLst>
+                    <a:ext uri="{A12FA001-AC4F-418D-AE19-62706E023703}">
+                      <ahyp:hlinkClr xmlns:ahyp="http://schemas.microsoft.com/office/drawing/2018/hyperlinkcolor" val="tx"/>
+                    </a:ext>
+                  </a:extLst>
+                </a:hlinkClick>
               </a:rPr>
               <a:t>DataHub.io</a:t>
             </a:r>
-            <a:endParaRPr lang="en-US" sz="2600" dirty="0"/>
+            <a:endParaRPr lang="en-US" sz="2600" dirty="0">
+              <a:ln>
+                <a:solidFill>
+                  <a:srgbClr val="EF4135">
+                    <a:alpha val="20000"/>
+                  </a:srgbClr>
+                </a:solidFill>
+              </a:ln>
+              <a:solidFill>
+                <a:srgbClr val="000066"/>
+              </a:solidFill>
+            </a:endParaRPr>
           </a:p>
           <a:p>
             <a:pPr marL="342900" indent="-342900" algn="l">
@@ -4146,37 +4511,150 @@
               <a:buChar char="•"/>
             </a:pPr>
             <a:r>
-              <a:rPr lang="en-US" sz="2600" dirty="0"/>
+              <a:rPr lang="en-US" sz="2600" dirty="0">
+                <a:ln>
+                  <a:solidFill>
+                    <a:srgbClr val="EF4135">
+                      <a:alpha val="20000"/>
+                    </a:srgbClr>
+                  </a:solidFill>
+                </a:ln>
+                <a:solidFill>
+                  <a:srgbClr val="000066"/>
+                </a:solidFill>
+              </a:rPr>
               <a:t>Final league tables (end of season standings) were found via </a:t>
             </a:r>
             <a:r>
               <a:rPr lang="en-US" sz="2600" dirty="0">
-                <a:hlinkClick r:id="rId4"/>
+                <a:ln>
+                  <a:solidFill>
+                    <a:srgbClr val="EF4135">
+                      <a:alpha val="20000"/>
+                    </a:srgbClr>
+                  </a:solidFill>
+                </a:ln>
+                <a:solidFill>
+                  <a:srgbClr val="000066"/>
+                </a:solidFill>
+                <a:hlinkClick r:id="rId4">
+                  <a:extLst>
+                    <a:ext uri="{A12FA001-AC4F-418D-AE19-62706E023703}">
+                      <ahyp:hlinkClr xmlns:ahyp="http://schemas.microsoft.com/office/drawing/2018/hyperlinkcolor" val="tx"/>
+                    </a:ext>
+                  </a:extLst>
+                </a:hlinkClick>
               </a:rPr>
               <a:t>Soccerassociation.com</a:t>
             </a:r>
-            <a:endParaRPr lang="en-US" sz="2600" dirty="0"/>
+            <a:endParaRPr lang="en-US" sz="2600" dirty="0">
+              <a:ln>
+                <a:solidFill>
+                  <a:srgbClr val="EF4135">
+                    <a:alpha val="20000"/>
+                  </a:srgbClr>
+                </a:solidFill>
+              </a:ln>
+              <a:solidFill>
+                <a:srgbClr val="000066"/>
+              </a:solidFill>
+            </a:endParaRPr>
           </a:p>
           <a:p>
             <a:pPr algn="l"/>
             <a:br>
-              <a:rPr lang="en-US" sz="2600" dirty="0"/>
+              <a:rPr lang="en-US" sz="2600" dirty="0">
+                <a:ln>
+                  <a:solidFill>
+                    <a:srgbClr val="EF4135">
+                      <a:alpha val="20000"/>
+                    </a:srgbClr>
+                  </a:solidFill>
+                </a:ln>
+                <a:solidFill>
+                  <a:srgbClr val="000066"/>
+                </a:solidFill>
+              </a:rPr>
             </a:br>
-            <a:endParaRPr lang="en-US" sz="2600" dirty="0"/>
-          </a:p>
-          <a:p>
-            <a:r>
-              <a:rPr lang="en-US" sz="2600" b="1" dirty="0"/>
-              <a:t>Ready? Let’s go </a:t>
+            <a:endParaRPr lang="en-US" sz="2600" dirty="0">
+              <a:ln>
+                <a:solidFill>
+                  <a:srgbClr val="EF4135">
+                    <a:alpha val="20000"/>
+                  </a:srgbClr>
+                </a:solidFill>
+              </a:ln>
+              <a:solidFill>
+                <a:srgbClr val="000066"/>
+              </a:solidFill>
+            </a:endParaRPr>
+          </a:p>
+          <a:p>
+            <a:r>
+              <a:rPr lang="en-US" sz="2600" dirty="0">
+                <a:ln>
+                  <a:solidFill>
+                    <a:srgbClr val="EF4135">
+                      <a:alpha val="20000"/>
+                    </a:srgbClr>
+                  </a:solidFill>
+                </a:ln>
+                <a:solidFill>
+                  <a:srgbClr val="000066"/>
+                </a:solidFill>
+              </a:rPr>
+              <a:t>Ready? Let’s go</a:t>
             </a:r>
             <a:r>
               <a:rPr lang="en-US" sz="2600" b="1" dirty="0">
-                <a:hlinkClick r:id="rId5"/>
+                <a:ln>
+                  <a:solidFill>
+                    <a:srgbClr val="EF4135">
+                      <a:alpha val="20000"/>
+                    </a:srgbClr>
+                  </a:solidFill>
+                </a:ln>
+                <a:solidFill>
+                  <a:srgbClr val="000066"/>
+                </a:solidFill>
+              </a:rPr>
+              <a:t> </a:t>
+            </a:r>
+            <a:r>
+              <a:rPr lang="en-US" sz="2600" b="1" dirty="0">
+                <a:ln>
+                  <a:solidFill>
+                    <a:srgbClr val="0055A4">
+                      <a:alpha val="20000"/>
+                    </a:srgbClr>
+                  </a:solidFill>
+                </a:ln>
+                <a:solidFill>
+                  <a:srgbClr val="EF4135"/>
+                </a:solidFill>
+                <a:hlinkClick r:id="rId5">
+                  <a:extLst>
+                    <a:ext uri="{A12FA001-AC4F-418D-AE19-62706E023703}">
+                      <ahyp:hlinkClr xmlns:ahyp="http://schemas.microsoft.com/office/drawing/2018/hyperlinkcolor" val="tx"/>
+                    </a:ext>
+                  </a:extLst>
+                </a:hlinkClick>
               </a:rPr>
               <a:t>here</a:t>
             </a:r>
             <a:r>
-              <a:rPr lang="en-US" sz="2600" b="1" dirty="0"/>
+              <a:rPr lang="en-US" sz="2600" dirty="0">
+                <a:ln>
+                  <a:solidFill>
+                    <a:srgbClr val="EF4135">
+                      <a:alpha val="20000"/>
+                    </a:srgbClr>
+                  </a:solidFill>
+                </a:ln>
+                <a:solidFill>
+                  <a:srgbClr val="000066"/>
+                </a:solidFill>
+              </a:rPr>
               <a:t> to see my Tableau presentation!</a:t>
             </a:r>
           </a:p>

</xml_diff>

<commit_message>
Overview of the project in PowerPoint.
</commit_message>
<xml_diff>
--- a/Transfer-Market-PowerPoint.pptx
+++ b/Transfer-Market-PowerPoint.pptx
@@ -263,7 +263,7 @@
           <a:p>
             <a:fld id="{FA1D6FA6-2F29-4068-8454-98446C90490B}" type="datetimeFigureOut">
               <a:rPr lang="en-US" smtClean="0"/>
-              <a:t>1/3/2020</a:t>
+              <a:t>1/4/2020</a:t>
             </a:fld>
             <a:endParaRPr lang="en-US"/>
           </a:p>
@@ -461,7 +461,7 @@
           <a:p>
             <a:fld id="{FA1D6FA6-2F29-4068-8454-98446C90490B}" type="datetimeFigureOut">
               <a:rPr lang="en-US" smtClean="0"/>
-              <a:t>1/3/2020</a:t>
+              <a:t>1/4/2020</a:t>
             </a:fld>
             <a:endParaRPr lang="en-US"/>
           </a:p>
@@ -669,7 +669,7 @@
           <a:p>
             <a:fld id="{FA1D6FA6-2F29-4068-8454-98446C90490B}" type="datetimeFigureOut">
               <a:rPr lang="en-US" smtClean="0"/>
-              <a:t>1/3/2020</a:t>
+              <a:t>1/4/2020</a:t>
             </a:fld>
             <a:endParaRPr lang="en-US"/>
           </a:p>
@@ -867,7 +867,7 @@
           <a:p>
             <a:fld id="{FA1D6FA6-2F29-4068-8454-98446C90490B}" type="datetimeFigureOut">
               <a:rPr lang="en-US" smtClean="0"/>
-              <a:t>1/3/2020</a:t>
+              <a:t>1/4/2020</a:t>
             </a:fld>
             <a:endParaRPr lang="en-US"/>
           </a:p>
@@ -1142,7 +1142,7 @@
           <a:p>
             <a:fld id="{FA1D6FA6-2F29-4068-8454-98446C90490B}" type="datetimeFigureOut">
               <a:rPr lang="en-US" smtClean="0"/>
-              <a:t>1/3/2020</a:t>
+              <a:t>1/4/2020</a:t>
             </a:fld>
             <a:endParaRPr lang="en-US"/>
           </a:p>
@@ -1407,7 +1407,7 @@
           <a:p>
             <a:fld id="{FA1D6FA6-2F29-4068-8454-98446C90490B}" type="datetimeFigureOut">
               <a:rPr lang="en-US" smtClean="0"/>
-              <a:t>1/3/2020</a:t>
+              <a:t>1/4/2020</a:t>
             </a:fld>
             <a:endParaRPr lang="en-US"/>
           </a:p>
@@ -1819,7 +1819,7 @@
           <a:p>
             <a:fld id="{FA1D6FA6-2F29-4068-8454-98446C90490B}" type="datetimeFigureOut">
               <a:rPr lang="en-US" smtClean="0"/>
-              <a:t>1/3/2020</a:t>
+              <a:t>1/4/2020</a:t>
             </a:fld>
             <a:endParaRPr lang="en-US"/>
           </a:p>
@@ -1960,7 +1960,7 @@
           <a:p>
             <a:fld id="{FA1D6FA6-2F29-4068-8454-98446C90490B}" type="datetimeFigureOut">
               <a:rPr lang="en-US" smtClean="0"/>
-              <a:t>1/3/2020</a:t>
+              <a:t>1/4/2020</a:t>
             </a:fld>
             <a:endParaRPr lang="en-US"/>
           </a:p>
@@ -2073,7 +2073,7 @@
           <a:p>
             <a:fld id="{FA1D6FA6-2F29-4068-8454-98446C90490B}" type="datetimeFigureOut">
               <a:rPr lang="en-US" smtClean="0"/>
-              <a:t>1/3/2020</a:t>
+              <a:t>1/4/2020</a:t>
             </a:fld>
             <a:endParaRPr lang="en-US"/>
           </a:p>
@@ -2384,7 +2384,7 @@
           <a:p>
             <a:fld id="{FA1D6FA6-2F29-4068-8454-98446C90490B}" type="datetimeFigureOut">
               <a:rPr lang="en-US" smtClean="0"/>
-              <a:t>1/3/2020</a:t>
+              <a:t>1/4/2020</a:t>
             </a:fld>
             <a:endParaRPr lang="en-US"/>
           </a:p>
@@ -2672,7 +2672,7 @@
           <a:p>
             <a:fld id="{FA1D6FA6-2F29-4068-8454-98446C90490B}" type="datetimeFigureOut">
               <a:rPr lang="en-US" smtClean="0"/>
-              <a:t>1/3/2020</a:t>
+              <a:t>1/4/2020</a:t>
             </a:fld>
             <a:endParaRPr lang="en-US"/>
           </a:p>
@@ -2913,7 +2913,7 @@
           <a:p>
             <a:fld id="{FA1D6FA6-2F29-4068-8454-98446C90490B}" type="datetimeFigureOut">
               <a:rPr lang="en-US" smtClean="0"/>
-              <a:t>1/3/2020</a:t>
+              <a:t>1/4/2020</a:t>
             </a:fld>
             <a:endParaRPr lang="en-US"/>
           </a:p>
@@ -4392,7 +4392,7 @@
         </p:spPr>
         <p:txBody>
           <a:bodyPr>
-            <a:normAutofit fontScale="92500" lnSpcReduction="10000"/>
+            <a:normAutofit fontScale="85000" lnSpcReduction="20000"/>
           </a:bodyPr>
           <a:lstStyle/>
           <a:p>
@@ -4401,7 +4401,7 @@
               <a:buChar char="•"/>
             </a:pPr>
             <a:r>
-              <a:rPr lang="en-US" sz="2600" dirty="0">
+              <a:rPr lang="en-US" sz="2800" dirty="0">
                 <a:ln>
                   <a:solidFill>
                     <a:srgbClr val="EF4135">
@@ -4416,7 +4416,7 @@
               <a:t>Player transfer data was found via </a:t>
             </a:r>
             <a:r>
-              <a:rPr lang="en-US" sz="2600" dirty="0">
+              <a:rPr lang="en-US" sz="2800" dirty="0">
                 <a:ln>
                   <a:solidFill>
                     <a:srgbClr val="EF4135">
@@ -4437,7 +4437,7 @@
               </a:rPr>
               <a:t>Transfermarkt.co.uk</a:t>
             </a:r>
-            <a:endParaRPr lang="en-US" sz="2600" dirty="0">
+            <a:endParaRPr lang="en-US" sz="2800" dirty="0">
               <a:ln>
                 <a:solidFill>
                   <a:srgbClr val="EF4135">
@@ -4456,7 +4456,7 @@
               <a:buChar char="•"/>
             </a:pPr>
             <a:r>
-              <a:rPr lang="en-US" sz="2600" dirty="0">
+              <a:rPr lang="en-US" sz="2800" dirty="0">
                 <a:ln>
                   <a:solidFill>
                     <a:srgbClr val="EF4135">
@@ -4471,7 +4471,7 @@
               <a:t>Match data was found via </a:t>
             </a:r>
             <a:r>
-              <a:rPr lang="en-US" sz="2600" dirty="0">
+              <a:rPr lang="en-US" sz="2800" dirty="0">
                 <a:ln>
                   <a:solidFill>
                     <a:srgbClr val="EF4135">
@@ -4492,7 +4492,7 @@
               </a:rPr>
               <a:t>DataHub.io</a:t>
             </a:r>
-            <a:endParaRPr lang="en-US" sz="2600" dirty="0">
+            <a:endParaRPr lang="en-US" sz="2800" dirty="0">
               <a:ln>
                 <a:solidFill>
                   <a:srgbClr val="EF4135">
@@ -4511,7 +4511,7 @@
               <a:buChar char="•"/>
             </a:pPr>
             <a:r>
-              <a:rPr lang="en-US" sz="2600" dirty="0">
+              <a:rPr lang="en-US" sz="2800" dirty="0">
                 <a:ln>
                   <a:solidFill>
                     <a:srgbClr val="EF4135">
@@ -4526,7 +4526,7 @@
               <a:t>Final league tables (end of season standings) were found via </a:t>
             </a:r>
             <a:r>
-              <a:rPr lang="en-US" sz="2600" dirty="0">
+              <a:rPr lang="en-US" sz="2800" dirty="0">
                 <a:ln>
                   <a:solidFill>
                     <a:srgbClr val="EF4135">
@@ -4547,7 +4547,7 @@
               </a:rPr>
               <a:t>Soccerassociation.com</a:t>
             </a:r>
-            <a:endParaRPr lang="en-US" sz="2600" dirty="0">
+            <a:endParaRPr lang="en-US" sz="2800" dirty="0">
               <a:ln>
                 <a:solidFill>
                   <a:srgbClr val="EF4135">
@@ -4561,9 +4561,12 @@
             </a:endParaRPr>
           </a:p>
           <a:p>
-            <a:pPr algn="l"/>
-            <a:br>
-              <a:rPr lang="en-US" sz="2600" dirty="0">
+            <a:pPr marL="342900" indent="-342900" algn="l">
+              <a:buFont typeface="Arial" panose="020B0604020202020204" pitchFamily="34" charset="0"/>
+              <a:buChar char="•"/>
+            </a:pPr>
+            <a:r>
+              <a:rPr lang="en-US" sz="2800" dirty="0">
                 <a:ln>
                   <a:solidFill>
                     <a:srgbClr val="EF4135">
@@ -4575,23 +4578,13 @@
                   <a:srgbClr val="000066"/>
                 </a:solidFill>
               </a:rPr>
-            </a:br>
-            <a:endParaRPr lang="en-US" sz="2600" dirty="0">
-              <a:ln>
-                <a:solidFill>
-                  <a:srgbClr val="EF4135">
-                    <a:alpha val="20000"/>
-                  </a:srgbClr>
-                </a:solidFill>
-              </a:ln>
-              <a:solidFill>
-                <a:srgbClr val="000066"/>
-              </a:solidFill>
-            </a:endParaRPr>
-          </a:p>
-          <a:p>
-            <a:r>
-              <a:rPr lang="en-US" sz="2600" dirty="0">
+              <a:t>Data range covers the 2009-2010 Season to the 2018-2019 Season</a:t>
+            </a:r>
+          </a:p>
+          <a:p>
+            <a:pPr algn="l"/>
+            <a:br>
+              <a:rPr lang="en-US" sz="2800" dirty="0">
                 <a:ln>
                   <a:solidFill>
                     <a:srgbClr val="EF4135">
@@ -4603,10 +4596,23 @@
                   <a:srgbClr val="000066"/>
                 </a:solidFill>
               </a:rPr>
-              <a:t>Ready? Let’s go</a:t>
-            </a:r>
-            <a:r>
-              <a:rPr lang="en-US" sz="2600" b="1" dirty="0">
+            </a:br>
+            <a:endParaRPr lang="en-US" sz="2800" dirty="0">
+              <a:ln>
+                <a:solidFill>
+                  <a:srgbClr val="EF4135">
+                    <a:alpha val="20000"/>
+                  </a:srgbClr>
+                </a:solidFill>
+              </a:ln>
+              <a:solidFill>
+                <a:srgbClr val="000066"/>
+              </a:solidFill>
+            </a:endParaRPr>
+          </a:p>
+          <a:p>
+            <a:r>
+              <a:rPr lang="en-US" sz="2800" dirty="0">
                 <a:ln>
                   <a:solidFill>
                     <a:srgbClr val="EF4135">
@@ -4618,10 +4624,25 @@
                   <a:srgbClr val="000066"/>
                 </a:solidFill>
               </a:rPr>
+              <a:t>Ready? Let’s go</a:t>
+            </a:r>
+            <a:r>
+              <a:rPr lang="en-US" sz="2800" b="1" dirty="0">
+                <a:ln>
+                  <a:solidFill>
+                    <a:srgbClr val="EF4135">
+                      <a:alpha val="20000"/>
+                    </a:srgbClr>
+                  </a:solidFill>
+                </a:ln>
+                <a:solidFill>
+                  <a:srgbClr val="000066"/>
+                </a:solidFill>
+              </a:rPr>
               <a:t> </a:t>
             </a:r>
             <a:r>
-              <a:rPr lang="en-US" sz="2600" b="1" dirty="0">
+              <a:rPr lang="en-US" sz="2800" b="1" dirty="0">
                 <a:ln>
                   <a:solidFill>
                     <a:srgbClr val="0055A4">
@@ -4643,7 +4664,7 @@
               <a:t>here</a:t>
             </a:r>
             <a:r>
-              <a:rPr lang="en-US" sz="2600" dirty="0">
+              <a:rPr lang="en-US" sz="2800" dirty="0">
                 <a:ln>
                   <a:solidFill>
                     <a:srgbClr val="EF4135">

</xml_diff>